<commit_message>
Updated to discuss cooperation
</commit_message>
<xml_diff>
--- a/docs/papers/journal papers/IEEE TAC Technical Note/fig/formulation.pptx
+++ b/docs/papers/journal papers/IEEE TAC Technical Note/fig/formulation.pptx
@@ -161,10 +161,9 @@
           <a:lstStyle/>
           <a:p>
             <a:r>
-              <a:rPr lang="en-US" smtClean="0"/>
+              <a:rPr lang="en-US"/>
               <a:t>Click to edit Master title style</a:t>
             </a:r>
-            <a:endParaRPr lang="en-US"/>
           </a:p>
         </p:txBody>
       </p:sp>
@@ -280,10 +279,9 @@
           </a:lstStyle>
           <a:p>
             <a:r>
-              <a:rPr lang="en-US" smtClean="0"/>
+              <a:rPr lang="en-US"/>
               <a:t>Click to edit Master subtitle style</a:t>
             </a:r>
-            <a:endParaRPr lang="en-US"/>
           </a:p>
         </p:txBody>
       </p:sp>
@@ -304,7 +302,7 @@
           <a:p>
             <a:fld id="{53C91556-06A3-4291-B43B-217C81F6E33C}" type="datetimeFigureOut">
               <a:rPr lang="en-US" smtClean="0"/>
-              <a:t>10/25/2014</a:t>
+              <a:t>4/18/2016</a:t>
             </a:fld>
             <a:endParaRPr lang="en-US"/>
           </a:p>
@@ -398,10 +396,9 @@
           <a:lstStyle/>
           <a:p>
             <a:r>
-              <a:rPr lang="en-US" smtClean="0"/>
+              <a:rPr lang="en-US"/>
               <a:t>Click to edit Master title style</a:t>
             </a:r>
-            <a:endParaRPr lang="en-US"/>
           </a:p>
         </p:txBody>
       </p:sp>
@@ -422,38 +419,37 @@
           <a:p>
             <a:pPr lvl="0"/>
             <a:r>
-              <a:rPr lang="en-US" smtClean="0"/>
+              <a:rPr lang="en-US"/>
               <a:t>Click to edit Master text styles</a:t>
             </a:r>
           </a:p>
           <a:p>
             <a:pPr lvl="1"/>
             <a:r>
-              <a:rPr lang="en-US" smtClean="0"/>
+              <a:rPr lang="en-US"/>
               <a:t>Second level</a:t>
             </a:r>
           </a:p>
           <a:p>
             <a:pPr lvl="2"/>
             <a:r>
-              <a:rPr lang="en-US" smtClean="0"/>
+              <a:rPr lang="en-US"/>
               <a:t>Third level</a:t>
             </a:r>
           </a:p>
           <a:p>
             <a:pPr lvl="3"/>
             <a:r>
-              <a:rPr lang="en-US" smtClean="0"/>
+              <a:rPr lang="en-US"/>
               <a:t>Fourth level</a:t>
             </a:r>
           </a:p>
           <a:p>
             <a:pPr lvl="4"/>
             <a:r>
-              <a:rPr lang="en-US" smtClean="0"/>
+              <a:rPr lang="en-US"/>
               <a:t>Fifth level</a:t>
             </a:r>
-            <a:endParaRPr lang="en-US"/>
           </a:p>
         </p:txBody>
       </p:sp>
@@ -474,7 +470,7 @@
           <a:p>
             <a:fld id="{53C91556-06A3-4291-B43B-217C81F6E33C}" type="datetimeFigureOut">
               <a:rPr lang="en-US" smtClean="0"/>
-              <a:t>10/25/2014</a:t>
+              <a:t>4/18/2016</a:t>
             </a:fld>
             <a:endParaRPr lang="en-US"/>
           </a:p>
@@ -573,10 +569,9 @@
           <a:lstStyle/>
           <a:p>
             <a:r>
-              <a:rPr lang="en-US" smtClean="0"/>
+              <a:rPr lang="en-US"/>
               <a:t>Click to edit Master title style</a:t>
             </a:r>
-            <a:endParaRPr lang="en-US"/>
           </a:p>
         </p:txBody>
       </p:sp>
@@ -602,38 +597,37 @@
           <a:p>
             <a:pPr lvl="0"/>
             <a:r>
-              <a:rPr lang="en-US" smtClean="0"/>
+              <a:rPr lang="en-US"/>
               <a:t>Click to edit Master text styles</a:t>
             </a:r>
           </a:p>
           <a:p>
             <a:pPr lvl="1"/>
             <a:r>
-              <a:rPr lang="en-US" smtClean="0"/>
+              <a:rPr lang="en-US"/>
               <a:t>Second level</a:t>
             </a:r>
           </a:p>
           <a:p>
             <a:pPr lvl="2"/>
             <a:r>
-              <a:rPr lang="en-US" smtClean="0"/>
+              <a:rPr lang="en-US"/>
               <a:t>Third level</a:t>
             </a:r>
           </a:p>
           <a:p>
             <a:pPr lvl="3"/>
             <a:r>
-              <a:rPr lang="en-US" smtClean="0"/>
+              <a:rPr lang="en-US"/>
               <a:t>Fourth level</a:t>
             </a:r>
           </a:p>
           <a:p>
             <a:pPr lvl="4"/>
             <a:r>
-              <a:rPr lang="en-US" smtClean="0"/>
+              <a:rPr lang="en-US"/>
               <a:t>Fifth level</a:t>
             </a:r>
-            <a:endParaRPr lang="en-US"/>
           </a:p>
         </p:txBody>
       </p:sp>
@@ -654,7 +648,7 @@
           <a:p>
             <a:fld id="{53C91556-06A3-4291-B43B-217C81F6E33C}" type="datetimeFigureOut">
               <a:rPr lang="en-US" smtClean="0"/>
-              <a:t>10/25/2014</a:t>
+              <a:t>4/18/2016</a:t>
             </a:fld>
             <a:endParaRPr lang="en-US"/>
           </a:p>
@@ -748,10 +742,9 @@
           <a:lstStyle/>
           <a:p>
             <a:r>
-              <a:rPr lang="en-US" smtClean="0"/>
+              <a:rPr lang="en-US"/>
               <a:t>Click to edit Master title style</a:t>
             </a:r>
-            <a:endParaRPr lang="en-US"/>
           </a:p>
         </p:txBody>
       </p:sp>
@@ -772,38 +765,37 @@
           <a:p>
             <a:pPr lvl="0"/>
             <a:r>
-              <a:rPr lang="en-US" smtClean="0"/>
+              <a:rPr lang="en-US"/>
               <a:t>Click to edit Master text styles</a:t>
             </a:r>
           </a:p>
           <a:p>
             <a:pPr lvl="1"/>
             <a:r>
-              <a:rPr lang="en-US" smtClean="0"/>
+              <a:rPr lang="en-US"/>
               <a:t>Second level</a:t>
             </a:r>
           </a:p>
           <a:p>
             <a:pPr lvl="2"/>
             <a:r>
-              <a:rPr lang="en-US" smtClean="0"/>
+              <a:rPr lang="en-US"/>
               <a:t>Third level</a:t>
             </a:r>
           </a:p>
           <a:p>
             <a:pPr lvl="3"/>
             <a:r>
-              <a:rPr lang="en-US" smtClean="0"/>
+              <a:rPr lang="en-US"/>
               <a:t>Fourth level</a:t>
             </a:r>
           </a:p>
           <a:p>
             <a:pPr lvl="4"/>
             <a:r>
-              <a:rPr lang="en-US" smtClean="0"/>
+              <a:rPr lang="en-US"/>
               <a:t>Fifth level</a:t>
             </a:r>
-            <a:endParaRPr lang="en-US"/>
           </a:p>
         </p:txBody>
       </p:sp>
@@ -824,7 +816,7 @@
           <a:p>
             <a:fld id="{53C91556-06A3-4291-B43B-217C81F6E33C}" type="datetimeFigureOut">
               <a:rPr lang="en-US" smtClean="0"/>
-              <a:t>10/25/2014</a:t>
+              <a:t>4/18/2016</a:t>
             </a:fld>
             <a:endParaRPr lang="en-US"/>
           </a:p>
@@ -927,10 +919,9 @@
           </a:lstStyle>
           <a:p>
             <a:r>
-              <a:rPr lang="en-US" smtClean="0"/>
+              <a:rPr lang="en-US"/>
               <a:t>Click to edit Master title style</a:t>
             </a:r>
-            <a:endParaRPr lang="en-US"/>
           </a:p>
         </p:txBody>
       </p:sp>
@@ -1047,7 +1038,7 @@
           <a:p>
             <a:pPr lvl="0"/>
             <a:r>
-              <a:rPr lang="en-US" smtClean="0"/>
+              <a:rPr lang="en-US"/>
               <a:t>Click to edit Master text styles</a:t>
             </a:r>
           </a:p>
@@ -1070,7 +1061,7 @@
           <a:p>
             <a:fld id="{53C91556-06A3-4291-B43B-217C81F6E33C}" type="datetimeFigureOut">
               <a:rPr lang="en-US" smtClean="0"/>
-              <a:t>10/25/2014</a:t>
+              <a:t>4/18/2016</a:t>
             </a:fld>
             <a:endParaRPr lang="en-US"/>
           </a:p>
@@ -1164,10 +1155,9 @@
           <a:lstStyle/>
           <a:p>
             <a:r>
-              <a:rPr lang="en-US" smtClean="0"/>
+              <a:rPr lang="en-US"/>
               <a:t>Click to edit Master title style</a:t>
             </a:r>
-            <a:endParaRPr lang="en-US"/>
           </a:p>
         </p:txBody>
       </p:sp>
@@ -1221,38 +1211,37 @@
           <a:p>
             <a:pPr lvl="0"/>
             <a:r>
-              <a:rPr lang="en-US" smtClean="0"/>
+              <a:rPr lang="en-US"/>
               <a:t>Click to edit Master text styles</a:t>
             </a:r>
           </a:p>
           <a:p>
             <a:pPr lvl="1"/>
             <a:r>
-              <a:rPr lang="en-US" smtClean="0"/>
+              <a:rPr lang="en-US"/>
               <a:t>Second level</a:t>
             </a:r>
           </a:p>
           <a:p>
             <a:pPr lvl="2"/>
             <a:r>
-              <a:rPr lang="en-US" smtClean="0"/>
+              <a:rPr lang="en-US"/>
               <a:t>Third level</a:t>
             </a:r>
           </a:p>
           <a:p>
             <a:pPr lvl="3"/>
             <a:r>
-              <a:rPr lang="en-US" smtClean="0"/>
+              <a:rPr lang="en-US"/>
               <a:t>Fourth level</a:t>
             </a:r>
           </a:p>
           <a:p>
             <a:pPr lvl="4"/>
             <a:r>
-              <a:rPr lang="en-US" smtClean="0"/>
+              <a:rPr lang="en-US"/>
               <a:t>Fifth level</a:t>
             </a:r>
-            <a:endParaRPr lang="en-US"/>
           </a:p>
         </p:txBody>
       </p:sp>
@@ -1306,38 +1295,37 @@
           <a:p>
             <a:pPr lvl="0"/>
             <a:r>
-              <a:rPr lang="en-US" smtClean="0"/>
+              <a:rPr lang="en-US"/>
               <a:t>Click to edit Master text styles</a:t>
             </a:r>
           </a:p>
           <a:p>
             <a:pPr lvl="1"/>
             <a:r>
-              <a:rPr lang="en-US" smtClean="0"/>
+              <a:rPr lang="en-US"/>
               <a:t>Second level</a:t>
             </a:r>
           </a:p>
           <a:p>
             <a:pPr lvl="2"/>
             <a:r>
-              <a:rPr lang="en-US" smtClean="0"/>
+              <a:rPr lang="en-US"/>
               <a:t>Third level</a:t>
             </a:r>
           </a:p>
           <a:p>
             <a:pPr lvl="3"/>
             <a:r>
-              <a:rPr lang="en-US" smtClean="0"/>
+              <a:rPr lang="en-US"/>
               <a:t>Fourth level</a:t>
             </a:r>
           </a:p>
           <a:p>
             <a:pPr lvl="4"/>
             <a:r>
-              <a:rPr lang="en-US" smtClean="0"/>
+              <a:rPr lang="en-US"/>
               <a:t>Fifth level</a:t>
             </a:r>
-            <a:endParaRPr lang="en-US"/>
           </a:p>
         </p:txBody>
       </p:sp>
@@ -1358,7 +1346,7 @@
           <a:p>
             <a:fld id="{53C91556-06A3-4291-B43B-217C81F6E33C}" type="datetimeFigureOut">
               <a:rPr lang="en-US" smtClean="0"/>
-              <a:t>10/25/2014</a:t>
+              <a:t>4/18/2016</a:t>
             </a:fld>
             <a:endParaRPr lang="en-US"/>
           </a:p>
@@ -1461,10 +1449,9 @@
           </a:lstStyle>
           <a:p>
             <a:r>
-              <a:rPr lang="en-US" smtClean="0"/>
+              <a:rPr lang="en-US"/>
               <a:t>Click to edit Master title style</a:t>
             </a:r>
-            <a:endParaRPr lang="en-US"/>
           </a:p>
         </p:txBody>
       </p:sp>
@@ -1527,7 +1514,7 @@
           <a:p>
             <a:pPr lvl="0"/>
             <a:r>
-              <a:rPr lang="en-US" smtClean="0"/>
+              <a:rPr lang="en-US"/>
               <a:t>Click to edit Master text styles</a:t>
             </a:r>
           </a:p>
@@ -1583,38 +1570,37 @@
           <a:p>
             <a:pPr lvl="0"/>
             <a:r>
-              <a:rPr lang="en-US" smtClean="0"/>
+              <a:rPr lang="en-US"/>
               <a:t>Click to edit Master text styles</a:t>
             </a:r>
           </a:p>
           <a:p>
             <a:pPr lvl="1"/>
             <a:r>
-              <a:rPr lang="en-US" smtClean="0"/>
+              <a:rPr lang="en-US"/>
               <a:t>Second level</a:t>
             </a:r>
           </a:p>
           <a:p>
             <a:pPr lvl="2"/>
             <a:r>
-              <a:rPr lang="en-US" smtClean="0"/>
+              <a:rPr lang="en-US"/>
               <a:t>Third level</a:t>
             </a:r>
           </a:p>
           <a:p>
             <a:pPr lvl="3"/>
             <a:r>
-              <a:rPr lang="en-US" smtClean="0"/>
+              <a:rPr lang="en-US"/>
               <a:t>Fourth level</a:t>
             </a:r>
           </a:p>
           <a:p>
             <a:pPr lvl="4"/>
             <a:r>
-              <a:rPr lang="en-US" smtClean="0"/>
+              <a:rPr lang="en-US"/>
               <a:t>Fifth level</a:t>
             </a:r>
-            <a:endParaRPr lang="en-US"/>
           </a:p>
         </p:txBody>
       </p:sp>
@@ -1677,7 +1663,7 @@
           <a:p>
             <a:pPr lvl="0"/>
             <a:r>
-              <a:rPr lang="en-US" smtClean="0"/>
+              <a:rPr lang="en-US"/>
               <a:t>Click to edit Master text styles</a:t>
             </a:r>
           </a:p>
@@ -1733,38 +1719,37 @@
           <a:p>
             <a:pPr lvl="0"/>
             <a:r>
-              <a:rPr lang="en-US" smtClean="0"/>
+              <a:rPr lang="en-US"/>
               <a:t>Click to edit Master text styles</a:t>
             </a:r>
           </a:p>
           <a:p>
             <a:pPr lvl="1"/>
             <a:r>
-              <a:rPr lang="en-US" smtClean="0"/>
+              <a:rPr lang="en-US"/>
               <a:t>Second level</a:t>
             </a:r>
           </a:p>
           <a:p>
             <a:pPr lvl="2"/>
             <a:r>
-              <a:rPr lang="en-US" smtClean="0"/>
+              <a:rPr lang="en-US"/>
               <a:t>Third level</a:t>
             </a:r>
           </a:p>
           <a:p>
             <a:pPr lvl="3"/>
             <a:r>
-              <a:rPr lang="en-US" smtClean="0"/>
+              <a:rPr lang="en-US"/>
               <a:t>Fourth level</a:t>
             </a:r>
           </a:p>
           <a:p>
             <a:pPr lvl="4"/>
             <a:r>
-              <a:rPr lang="en-US" smtClean="0"/>
+              <a:rPr lang="en-US"/>
               <a:t>Fifth level</a:t>
             </a:r>
-            <a:endParaRPr lang="en-US"/>
           </a:p>
         </p:txBody>
       </p:sp>
@@ -1785,7 +1770,7 @@
           <a:p>
             <a:fld id="{53C91556-06A3-4291-B43B-217C81F6E33C}" type="datetimeFigureOut">
               <a:rPr lang="en-US" smtClean="0"/>
-              <a:t>10/25/2014</a:t>
+              <a:t>4/18/2016</a:t>
             </a:fld>
             <a:endParaRPr lang="en-US"/>
           </a:p>
@@ -1879,10 +1864,9 @@
           <a:lstStyle/>
           <a:p>
             <a:r>
-              <a:rPr lang="en-US" smtClean="0"/>
+              <a:rPr lang="en-US"/>
               <a:t>Click to edit Master title style</a:t>
             </a:r>
-            <a:endParaRPr lang="en-US"/>
           </a:p>
         </p:txBody>
       </p:sp>
@@ -1903,7 +1887,7 @@
           <a:p>
             <a:fld id="{53C91556-06A3-4291-B43B-217C81F6E33C}" type="datetimeFigureOut">
               <a:rPr lang="en-US" smtClean="0"/>
-              <a:t>10/25/2014</a:t>
+              <a:t>4/18/2016</a:t>
             </a:fld>
             <a:endParaRPr lang="en-US"/>
           </a:p>
@@ -1998,7 +1982,7 @@
           <a:p>
             <a:fld id="{53C91556-06A3-4291-B43B-217C81F6E33C}" type="datetimeFigureOut">
               <a:rPr lang="en-US" smtClean="0"/>
-              <a:t>10/25/2014</a:t>
+              <a:t>4/18/2016</a:t>
             </a:fld>
             <a:endParaRPr lang="en-US"/>
           </a:p>
@@ -2101,10 +2085,9 @@
           </a:lstStyle>
           <a:p>
             <a:r>
-              <a:rPr lang="en-US" smtClean="0"/>
+              <a:rPr lang="en-US"/>
               <a:t>Click to edit Master title style</a:t>
             </a:r>
-            <a:endParaRPr lang="en-US"/>
           </a:p>
         </p:txBody>
       </p:sp>
@@ -2158,38 +2141,37 @@
           <a:p>
             <a:pPr lvl="0"/>
             <a:r>
-              <a:rPr lang="en-US" smtClean="0"/>
+              <a:rPr lang="en-US"/>
               <a:t>Click to edit Master text styles</a:t>
             </a:r>
           </a:p>
           <a:p>
             <a:pPr lvl="1"/>
             <a:r>
-              <a:rPr lang="en-US" smtClean="0"/>
+              <a:rPr lang="en-US"/>
               <a:t>Second level</a:t>
             </a:r>
           </a:p>
           <a:p>
             <a:pPr lvl="2"/>
             <a:r>
-              <a:rPr lang="en-US" smtClean="0"/>
+              <a:rPr lang="en-US"/>
               <a:t>Third level</a:t>
             </a:r>
           </a:p>
           <a:p>
             <a:pPr lvl="3"/>
             <a:r>
-              <a:rPr lang="en-US" smtClean="0"/>
+              <a:rPr lang="en-US"/>
               <a:t>Fourth level</a:t>
             </a:r>
           </a:p>
           <a:p>
             <a:pPr lvl="4"/>
             <a:r>
-              <a:rPr lang="en-US" smtClean="0"/>
+              <a:rPr lang="en-US"/>
               <a:t>Fifth level</a:t>
             </a:r>
-            <a:endParaRPr lang="en-US"/>
           </a:p>
         </p:txBody>
       </p:sp>
@@ -2252,7 +2234,7 @@
           <a:p>
             <a:pPr lvl="0"/>
             <a:r>
-              <a:rPr lang="en-US" smtClean="0"/>
+              <a:rPr lang="en-US"/>
               <a:t>Click to edit Master text styles</a:t>
             </a:r>
           </a:p>
@@ -2275,7 +2257,7 @@
           <a:p>
             <a:fld id="{53C91556-06A3-4291-B43B-217C81F6E33C}" type="datetimeFigureOut">
               <a:rPr lang="en-US" smtClean="0"/>
-              <a:t>10/25/2014</a:t>
+              <a:t>4/18/2016</a:t>
             </a:fld>
             <a:endParaRPr lang="en-US"/>
           </a:p>
@@ -2378,10 +2360,9 @@
           </a:lstStyle>
           <a:p>
             <a:r>
-              <a:rPr lang="en-US" smtClean="0"/>
+              <a:rPr lang="en-US"/>
               <a:t>Click to edit Master title style</a:t>
             </a:r>
-            <a:endParaRPr lang="en-US"/>
           </a:p>
         </p:txBody>
       </p:sp>
@@ -2505,7 +2486,7 @@
           <a:p>
             <a:pPr lvl="0"/>
             <a:r>
-              <a:rPr lang="en-US" smtClean="0"/>
+              <a:rPr lang="en-US"/>
               <a:t>Click to edit Master text styles</a:t>
             </a:r>
           </a:p>
@@ -2528,7 +2509,7 @@
           <a:p>
             <a:fld id="{53C91556-06A3-4291-B43B-217C81F6E33C}" type="datetimeFigureOut">
               <a:rPr lang="en-US" smtClean="0"/>
-              <a:t>10/25/2014</a:t>
+              <a:t>4/18/2016</a:t>
             </a:fld>
             <a:endParaRPr lang="en-US"/>
           </a:p>
@@ -2637,10 +2618,9 @@
           <a:lstStyle/>
           <a:p>
             <a:r>
-              <a:rPr lang="en-US" smtClean="0"/>
+              <a:rPr lang="en-US"/>
               <a:t>Click to edit Master title style</a:t>
             </a:r>
-            <a:endParaRPr lang="en-US"/>
           </a:p>
         </p:txBody>
       </p:sp>
@@ -2671,38 +2651,37 @@
           <a:p>
             <a:pPr lvl="0"/>
             <a:r>
-              <a:rPr lang="en-US" smtClean="0"/>
+              <a:rPr lang="en-US"/>
               <a:t>Click to edit Master text styles</a:t>
             </a:r>
           </a:p>
           <a:p>
             <a:pPr lvl="1"/>
             <a:r>
-              <a:rPr lang="en-US" smtClean="0"/>
+              <a:rPr lang="en-US"/>
               <a:t>Second level</a:t>
             </a:r>
           </a:p>
           <a:p>
             <a:pPr lvl="2"/>
             <a:r>
-              <a:rPr lang="en-US" smtClean="0"/>
+              <a:rPr lang="en-US"/>
               <a:t>Third level</a:t>
             </a:r>
           </a:p>
           <a:p>
             <a:pPr lvl="3"/>
             <a:r>
-              <a:rPr lang="en-US" smtClean="0"/>
+              <a:rPr lang="en-US"/>
               <a:t>Fourth level</a:t>
             </a:r>
           </a:p>
           <a:p>
             <a:pPr lvl="4"/>
             <a:r>
-              <a:rPr lang="en-US" smtClean="0"/>
+              <a:rPr lang="en-US"/>
               <a:t>Fifth level</a:t>
             </a:r>
-            <a:endParaRPr lang="en-US"/>
           </a:p>
         </p:txBody>
       </p:sp>
@@ -2741,7 +2720,7 @@
           <a:p>
             <a:fld id="{53C91556-06A3-4291-B43B-217C81F6E33C}" type="datetimeFigureOut">
               <a:rPr lang="en-US" smtClean="0"/>
-              <a:t>10/25/2014</a:t>
+              <a:t>4/18/2016</a:t>
             </a:fld>
             <a:endParaRPr lang="en-US"/>
           </a:p>
@@ -3283,8 +3262,8 @@
           </a:p>
         </p:txBody>
       </p:sp>
-      <mc:AlternateContent xmlns:mc="http://schemas.openxmlformats.org/markup-compatibility/2006">
-        <mc:Choice xmlns:a14="http://schemas.microsoft.com/office/drawing/2010/main" Requires="a14">
+      <mc:AlternateContent xmlns:mc="http://schemas.openxmlformats.org/markup-compatibility/2006" xmlns:a14="http://schemas.microsoft.com/office/drawing/2010/main">
+        <mc:Choice Requires="a14">
           <p:sp>
             <p:nvSpPr>
               <p:cNvPr id="126" name="Oval 125"/>
@@ -3364,7 +3343,7 @@
             </p:txBody>
           </p:sp>
         </mc:Choice>
-        <mc:Fallback>
+        <mc:Fallback xmlns="">
           <p:sp>
             <p:nvSpPr>
               <p:cNvPr id="126" name="Oval 125"/>
@@ -3403,8 +3382,8 @@
           </p:sp>
         </mc:Fallback>
       </mc:AlternateContent>
-      <mc:AlternateContent xmlns:mc="http://schemas.openxmlformats.org/markup-compatibility/2006">
-        <mc:Choice xmlns:a14="http://schemas.microsoft.com/office/drawing/2010/main" Requires="a14">
+      <mc:AlternateContent xmlns:mc="http://schemas.openxmlformats.org/markup-compatibility/2006" xmlns:a14="http://schemas.microsoft.com/office/drawing/2010/main">
+        <mc:Choice Requires="a14">
           <p:sp>
             <p:nvSpPr>
               <p:cNvPr id="127" name="Oval 126"/>
@@ -3484,7 +3463,7 @@
             </p:txBody>
           </p:sp>
         </mc:Choice>
-        <mc:Fallback>
+        <mc:Fallback xmlns="">
           <p:sp>
             <p:nvSpPr>
               <p:cNvPr id="127" name="Oval 126"/>
@@ -3546,7 +3525,7 @@
           <a:lstStyle/>
           <a:p>
             <a:r>
-              <a:rPr lang="en-CA" sz="2800" dirty="0" smtClean="0"/>
+              <a:rPr lang="en-CA" sz="2800" dirty="0"/>
               <a:t>Target</a:t>
             </a:r>
           </a:p>
@@ -3558,13 +3537,13 @@
           </a:p>
           <a:p>
             <a:r>
-              <a:rPr lang="en-CA" sz="2800" dirty="0" smtClean="0"/>
+              <a:rPr lang="en-CA" sz="2800" dirty="0"/>
               <a:t>defender</a:t>
             </a:r>
           </a:p>
           <a:p>
             <a:r>
-              <a:rPr lang="en-CA" sz="2800" dirty="0" smtClean="0"/>
+              <a:rPr lang="en-CA" sz="2800" dirty="0"/>
               <a:t>attacker</a:t>
             </a:r>
           </a:p>
@@ -3841,7 +3820,7 @@
             <p:spPr>
               <a:xfrm>
                 <a:off x="5984192" y="1106070"/>
-                <a:ext cx="1283074" cy="523220"/>
+                <a:ext cx="1283074" cy="623825"/>
               </a:xfrm>
               <a:prstGeom prst="rect">
                 <a:avLst/>
@@ -3872,18 +3851,37 @@
                         <m:e>
                           <m:r>
                             <a:rPr lang="en-US" sz="2800" b="0" i="1" smtClean="0">
-                              <a:latin typeface="Cambria Math"/>
+                              <a:latin typeface="Cambria Math" panose="02040503050406030204" pitchFamily="18" charset="0"/>
                             </a:rPr>
-                            <m:t>𝐷</m:t>
+                            <m:t>𝑃</m:t>
                           </m:r>
                         </m:e>
                         <m:sub>
-                          <m:r>
-                            <a:rPr lang="en-US" sz="2800" b="0" i="1" smtClean="0">
-                              <a:latin typeface="Cambria Math"/>
-                            </a:rPr>
-                            <m:t>1</m:t>
-                          </m:r>
+                          <m:sSub>
+                            <m:sSubPr>
+                              <m:ctrlPr>
+                                <a:rPr lang="en-US" sz="2800" b="0" i="1" smtClean="0">
+                                  <a:latin typeface="Cambria Math" panose="02040503050406030204" pitchFamily="18" charset="0"/>
+                                </a:rPr>
+                              </m:ctrlPr>
+                            </m:sSubPr>
+                            <m:e>
+                              <m:r>
+                                <a:rPr lang="en-US" sz="2800" b="0" i="1" smtClean="0">
+                                  <a:latin typeface="Cambria Math"/>
+                                </a:rPr>
+                                <m:t>𝐷</m:t>
+                              </m:r>
+                            </m:e>
+                            <m:sub>
+                              <m:r>
+                                <a:rPr lang="en-US" sz="2800" b="0" i="1" smtClean="0">
+                                  <a:latin typeface="Cambria Math"/>
+                                </a:rPr>
+                                <m:t>1</m:t>
+                              </m:r>
+                            </m:sub>
+                          </m:sSub>
                         </m:sub>
                       </m:sSub>
                       <m:r>
@@ -3903,18 +3901,56 @@
                         <m:e>
                           <m:r>
                             <a:rPr lang="en-US" sz="2800" b="0" i="1" smtClean="0">
-                              <a:latin typeface="Cambria Math"/>
+                              <a:latin typeface="Cambria Math" panose="02040503050406030204" pitchFamily="18" charset="0"/>
                             </a:rPr>
-                            <m:t>𝐷</m:t>
+                            <m:t>𝑃</m:t>
                           </m:r>
                         </m:e>
                         <m:sub>
-                          <m:r>
-                            <a:rPr lang="en-US" sz="2800" b="0" i="1" smtClean="0">
-                              <a:latin typeface="Cambria Math" panose="02040503050406030204" pitchFamily="18" charset="0"/>
-                            </a:rPr>
-                            <m:t>𝑁</m:t>
-                          </m:r>
+                          <m:sSub>
+                            <m:sSubPr>
+                              <m:ctrlPr>
+                                <a:rPr lang="en-US" sz="2800" b="0" i="1" smtClean="0">
+                                  <a:latin typeface="Cambria Math" panose="02040503050406030204" pitchFamily="18" charset="0"/>
+                                </a:rPr>
+                              </m:ctrlPr>
+                            </m:sSubPr>
+                            <m:e>
+                              <m:r>
+                                <a:rPr lang="en-US" sz="2800" b="0" i="1" smtClean="0">
+                                  <a:latin typeface="Cambria Math"/>
+                                </a:rPr>
+                                <m:t>𝐷</m:t>
+                              </m:r>
+                            </m:e>
+                            <m:sub>
+                              <m:sSub>
+                                <m:sSubPr>
+                                  <m:ctrlPr>
+                                    <a:rPr lang="en-US" sz="2800" b="0" i="1" smtClean="0">
+                                      <a:latin typeface="Cambria Math" panose="02040503050406030204" pitchFamily="18" charset="0"/>
+                                    </a:rPr>
+                                  </m:ctrlPr>
+                                </m:sSubPr>
+                                <m:e>
+                                  <m:r>
+                                    <a:rPr lang="en-US" sz="2800" b="0" i="1" smtClean="0">
+                                      <a:latin typeface="Cambria Math" panose="02040503050406030204" pitchFamily="18" charset="0"/>
+                                    </a:rPr>
+                                    <m:t>𝑁</m:t>
+                                  </m:r>
+                                </m:e>
+                                <m:sub>
+                                  <m:r>
+                                    <a:rPr lang="en-US" sz="2800" b="0" i="1" smtClean="0">
+                                      <a:latin typeface="Cambria Math" panose="02040503050406030204" pitchFamily="18" charset="0"/>
+                                    </a:rPr>
+                                    <m:t>𝐷</m:t>
+                                  </m:r>
+                                </m:sub>
+                              </m:sSub>
+                            </m:sub>
+                          </m:sSub>
                         </m:sub>
                       </m:sSub>
                     </m:oMath>
@@ -3937,15 +3973,15 @@
             <p:spPr>
               <a:xfrm>
                 <a:off x="5984192" y="1106070"/>
-                <a:ext cx="1283074" cy="523220"/>
+                <a:ext cx="1283074" cy="623825"/>
               </a:xfrm>
               <a:prstGeom prst="rect">
                 <a:avLst/>
               </a:prstGeom>
-              <a:blipFill rotWithShape="0">
+              <a:blipFill>
                 <a:blip r:embed="rId7"/>
                 <a:stretch>
-                  <a:fillRect r="-15714"/>
+                  <a:fillRect r="-47143"/>
                 </a:stretch>
               </a:blipFill>
             </p:spPr>
@@ -3975,7 +4011,7 @@
             <p:spPr>
               <a:xfrm>
                 <a:off x="3233586" y="3254842"/>
-                <a:ext cx="1283074" cy="523220"/>
+                <a:ext cx="1283074" cy="626262"/>
               </a:xfrm>
               <a:prstGeom prst="rect">
                 <a:avLst/>
@@ -4006,18 +4042,37 @@
                         <m:e>
                           <m:r>
                             <a:rPr lang="en-US" sz="2800" b="0" i="1" smtClean="0">
-                              <a:latin typeface="Cambria Math"/>
+                              <a:latin typeface="Cambria Math" panose="02040503050406030204" pitchFamily="18" charset="0"/>
                             </a:rPr>
-                            <m:t>𝐴</m:t>
+                            <m:t>𝑃</m:t>
                           </m:r>
                         </m:e>
                         <m:sub>
-                          <m:r>
-                            <a:rPr lang="en-US" sz="2800" b="0" i="1" smtClean="0">
-                              <a:latin typeface="Cambria Math"/>
-                            </a:rPr>
-                            <m:t>1</m:t>
-                          </m:r>
+                          <m:sSub>
+                            <m:sSubPr>
+                              <m:ctrlPr>
+                                <a:rPr lang="en-US" sz="2800" b="0" i="1" smtClean="0">
+                                  <a:latin typeface="Cambria Math" panose="02040503050406030204" pitchFamily="18" charset="0"/>
+                                </a:rPr>
+                              </m:ctrlPr>
+                            </m:sSubPr>
+                            <m:e>
+                              <m:r>
+                                <a:rPr lang="en-US" sz="2800" b="0" i="1" smtClean="0">
+                                  <a:latin typeface="Cambria Math"/>
+                                </a:rPr>
+                                <m:t>𝐴</m:t>
+                              </m:r>
+                            </m:e>
+                            <m:sub>
+                              <m:r>
+                                <a:rPr lang="en-US" sz="2800" b="0" i="1" smtClean="0">
+                                  <a:latin typeface="Cambria Math"/>
+                                </a:rPr>
+                                <m:t>1</m:t>
+                              </m:r>
+                            </m:sub>
+                          </m:sSub>
                         </m:sub>
                       </m:sSub>
                       <m:r>
@@ -4037,18 +4092,56 @@
                         <m:e>
                           <m:r>
                             <a:rPr lang="en-US" sz="2800" b="0" i="1" smtClean="0">
-                              <a:latin typeface="Cambria Math"/>
+                              <a:latin typeface="Cambria Math" panose="02040503050406030204" pitchFamily="18" charset="0"/>
                             </a:rPr>
-                            <m:t>𝐴</m:t>
+                            <m:t>𝑃</m:t>
                           </m:r>
                         </m:e>
                         <m:sub>
-                          <m:r>
-                            <a:rPr lang="en-US" sz="2800" b="0" i="1" smtClean="0">
-                              <a:latin typeface="Cambria Math" panose="02040503050406030204" pitchFamily="18" charset="0"/>
-                            </a:rPr>
-                            <m:t>𝑁</m:t>
-                          </m:r>
+                          <m:sSub>
+                            <m:sSubPr>
+                              <m:ctrlPr>
+                                <a:rPr lang="en-US" sz="2800" b="0" i="1" smtClean="0">
+                                  <a:latin typeface="Cambria Math" panose="02040503050406030204" pitchFamily="18" charset="0"/>
+                                </a:rPr>
+                              </m:ctrlPr>
+                            </m:sSubPr>
+                            <m:e>
+                              <m:r>
+                                <a:rPr lang="en-US" sz="2800" b="0" i="1" smtClean="0">
+                                  <a:latin typeface="Cambria Math"/>
+                                </a:rPr>
+                                <m:t>𝐴</m:t>
+                              </m:r>
+                            </m:e>
+                            <m:sub>
+                              <m:sSub>
+                                <m:sSubPr>
+                                  <m:ctrlPr>
+                                    <a:rPr lang="en-US" sz="2800" b="0" i="1" smtClean="0">
+                                      <a:latin typeface="Cambria Math" panose="02040503050406030204" pitchFamily="18" charset="0"/>
+                                    </a:rPr>
+                                  </m:ctrlPr>
+                                </m:sSubPr>
+                                <m:e>
+                                  <m:r>
+                                    <a:rPr lang="en-US" sz="2800" b="0" i="1" smtClean="0">
+                                      <a:latin typeface="Cambria Math" panose="02040503050406030204" pitchFamily="18" charset="0"/>
+                                    </a:rPr>
+                                    <m:t>𝑁</m:t>
+                                  </m:r>
+                                </m:e>
+                                <m:sub>
+                                  <m:r>
+                                    <a:rPr lang="en-US" sz="2800" b="0" i="1" smtClean="0">
+                                      <a:latin typeface="Cambria Math" panose="02040503050406030204" pitchFamily="18" charset="0"/>
+                                    </a:rPr>
+                                    <m:t>𝐴</m:t>
+                                  </m:r>
+                                </m:sub>
+                              </m:sSub>
+                            </m:sub>
+                          </m:sSub>
                         </m:sub>
                       </m:sSub>
                     </m:oMath>
@@ -4071,15 +4164,15 @@
             <p:spPr>
               <a:xfrm>
                 <a:off x="3233586" y="3254842"/>
-                <a:ext cx="1283074" cy="523220"/>
+                <a:ext cx="1283074" cy="626262"/>
               </a:xfrm>
               <a:prstGeom prst="rect">
                 <a:avLst/>
               </a:prstGeom>
-              <a:blipFill rotWithShape="0">
+              <a:blipFill>
                 <a:blip r:embed="rId8"/>
                 <a:stretch>
-                  <a:fillRect r="-15166"/>
+                  <a:fillRect r="-42654"/>
                 </a:stretch>
               </a:blipFill>
             </p:spPr>
@@ -4098,8 +4191,8 @@
           </p:sp>
         </mc:Fallback>
       </mc:AlternateContent>
-      <mc:AlternateContent xmlns:mc="http://schemas.openxmlformats.org/markup-compatibility/2006">
-        <mc:Choice xmlns:a14="http://schemas.microsoft.com/office/drawing/2010/main" Requires="a14">
+      <mc:AlternateContent xmlns:mc="http://schemas.openxmlformats.org/markup-compatibility/2006" xmlns:a14="http://schemas.microsoft.com/office/drawing/2010/main">
+        <mc:Choice Requires="a14">
           <p:sp>
             <p:nvSpPr>
               <p:cNvPr id="147" name="TextBox 146"/>
@@ -4168,7 +4261,7 @@
             </p:txBody>
           </p:sp>
         </mc:Choice>
-        <mc:Fallback>
+        <mc:Fallback xmlns="">
           <p:sp>
             <p:nvSpPr>
               <p:cNvPr id="147" name="TextBox 146"/>
@@ -4687,13 +4780,6 @@
   <p:clrMapOvr>
     <a:masterClrMapping/>
   </p:clrMapOvr>
-  <p:timing>
-    <p:tnLst>
-      <p:par>
-        <p:cTn id="1" dur="indefinite" restart="never" nodeType="tmRoot"/>
-      </p:par>
-    </p:tnLst>
-  </p:timing>
 </p:sld>
 </file>
 

</xml_diff>